<commit_message>
language appStorage works again
</commit_message>
<xml_diff>
--- a/logo.pptx
+++ b/logo.pptx
@@ -12,9 +12,11 @@
     <p:sldId id="263" r:id="rId6"/>
     <p:sldId id="265" r:id="rId7"/>
     <p:sldId id="266" r:id="rId8"/>
-    <p:sldId id="257" r:id="rId9"/>
-    <p:sldId id="258" r:id="rId10"/>
-    <p:sldId id="259" r:id="rId11"/>
+    <p:sldId id="267" r:id="rId9"/>
+    <p:sldId id="268" r:id="rId10"/>
+    <p:sldId id="257" r:id="rId11"/>
+    <p:sldId id="258" r:id="rId12"/>
+    <p:sldId id="259" r:id="rId13"/>
   </p:sldIdLst>
   <p:sldSz cx="12192000" cy="6858000"/>
   <p:notesSz cx="6858000" cy="9144000"/>
@@ -270,7 +272,7 @@
           <a:p>
             <a:fld id="{D5E8C49D-3947-054D-A87C-1567D1C262C1}" type="datetimeFigureOut">
               <a:rPr lang="en-VN" smtClean="0"/>
-              <a:t>12/25/23</a:t>
+              <a:t>12/27/23</a:t>
             </a:fld>
             <a:endParaRPr lang="en-VN"/>
           </a:p>
@@ -470,7 +472,7 @@
           <a:p>
             <a:fld id="{D5E8C49D-3947-054D-A87C-1567D1C262C1}" type="datetimeFigureOut">
               <a:rPr lang="en-VN" smtClean="0"/>
-              <a:t>12/25/23</a:t>
+              <a:t>12/27/23</a:t>
             </a:fld>
             <a:endParaRPr lang="en-VN"/>
           </a:p>
@@ -680,7 +682,7 @@
           <a:p>
             <a:fld id="{D5E8C49D-3947-054D-A87C-1567D1C262C1}" type="datetimeFigureOut">
               <a:rPr lang="en-VN" smtClean="0"/>
-              <a:t>12/25/23</a:t>
+              <a:t>12/27/23</a:t>
             </a:fld>
             <a:endParaRPr lang="en-VN"/>
           </a:p>
@@ -880,7 +882,7 @@
           <a:p>
             <a:fld id="{D5E8C49D-3947-054D-A87C-1567D1C262C1}" type="datetimeFigureOut">
               <a:rPr lang="en-VN" smtClean="0"/>
-              <a:t>12/25/23</a:t>
+              <a:t>12/27/23</a:t>
             </a:fld>
             <a:endParaRPr lang="en-VN"/>
           </a:p>
@@ -1156,7 +1158,7 @@
           <a:p>
             <a:fld id="{D5E8C49D-3947-054D-A87C-1567D1C262C1}" type="datetimeFigureOut">
               <a:rPr lang="en-VN" smtClean="0"/>
-              <a:t>12/25/23</a:t>
+              <a:t>12/27/23</a:t>
             </a:fld>
             <a:endParaRPr lang="en-VN"/>
           </a:p>
@@ -1424,7 +1426,7 @@
           <a:p>
             <a:fld id="{D5E8C49D-3947-054D-A87C-1567D1C262C1}" type="datetimeFigureOut">
               <a:rPr lang="en-VN" smtClean="0"/>
-              <a:t>12/25/23</a:t>
+              <a:t>12/27/23</a:t>
             </a:fld>
             <a:endParaRPr lang="en-VN"/>
           </a:p>
@@ -1839,7 +1841,7 @@
           <a:p>
             <a:fld id="{D5E8C49D-3947-054D-A87C-1567D1C262C1}" type="datetimeFigureOut">
               <a:rPr lang="en-VN" smtClean="0"/>
-              <a:t>12/25/23</a:t>
+              <a:t>12/27/23</a:t>
             </a:fld>
             <a:endParaRPr lang="en-VN"/>
           </a:p>
@@ -1981,7 +1983,7 @@
           <a:p>
             <a:fld id="{D5E8C49D-3947-054D-A87C-1567D1C262C1}" type="datetimeFigureOut">
               <a:rPr lang="en-VN" smtClean="0"/>
-              <a:t>12/25/23</a:t>
+              <a:t>12/27/23</a:t>
             </a:fld>
             <a:endParaRPr lang="en-VN"/>
           </a:p>
@@ -2094,7 +2096,7 @@
           <a:p>
             <a:fld id="{D5E8C49D-3947-054D-A87C-1567D1C262C1}" type="datetimeFigureOut">
               <a:rPr lang="en-VN" smtClean="0"/>
-              <a:t>12/25/23</a:t>
+              <a:t>12/27/23</a:t>
             </a:fld>
             <a:endParaRPr lang="en-VN"/>
           </a:p>
@@ -2407,7 +2409,7 @@
           <a:p>
             <a:fld id="{D5E8C49D-3947-054D-A87C-1567D1C262C1}" type="datetimeFigureOut">
               <a:rPr lang="en-VN" smtClean="0"/>
-              <a:t>12/25/23</a:t>
+              <a:t>12/27/23</a:t>
             </a:fld>
             <a:endParaRPr lang="en-VN"/>
           </a:p>
@@ -2696,7 +2698,7 @@
           <a:p>
             <a:fld id="{D5E8C49D-3947-054D-A87C-1567D1C262C1}" type="datetimeFigureOut">
               <a:rPr lang="en-VN" smtClean="0"/>
-              <a:t>12/25/23</a:t>
+              <a:t>12/27/23</a:t>
             </a:fld>
             <a:endParaRPr lang="en-VN"/>
           </a:p>
@@ -2939,7 +2941,7 @@
           <a:p>
             <a:fld id="{D5E8C49D-3947-054D-A87C-1567D1C262C1}" type="datetimeFigureOut">
               <a:rPr lang="en-VN" smtClean="0"/>
-              <a:t>12/25/23</a:t>
+              <a:t>12/27/23</a:t>
             </a:fld>
             <a:endParaRPr lang="en-VN"/>
           </a:p>
@@ -4382,994 +4384,6 @@
       </p:grpSpPr>
       <p:grpSp>
         <p:nvGrpSpPr>
-          <p:cNvPr id="2" name="Group 1">
-            <a:extLst>
-              <a:ext uri="{FF2B5EF4-FFF2-40B4-BE49-F238E27FC236}">
-                <a16:creationId xmlns:a16="http://schemas.microsoft.com/office/drawing/2014/main" id="{BF4BEEF5-D775-1826-A760-CF76CA0E3BDB}"/>
-              </a:ext>
-            </a:extLst>
-          </p:cNvPr>
-          <p:cNvGrpSpPr/>
-          <p:nvPr/>
-        </p:nvGrpSpPr>
-        <p:grpSpPr>
-          <a:xfrm>
-            <a:off x="4591050" y="2425700"/>
-            <a:ext cx="3009900" cy="2006600"/>
-            <a:chOff x="4591050" y="2425700"/>
-            <a:chExt cx="3009900" cy="2006600"/>
-          </a:xfrm>
-        </p:grpSpPr>
-        <p:pic>
-          <p:nvPicPr>
-            <p:cNvPr id="3" name="Picture 2">
-              <a:extLst>
-                <a:ext uri="{FF2B5EF4-FFF2-40B4-BE49-F238E27FC236}">
-                  <a16:creationId xmlns:a16="http://schemas.microsoft.com/office/drawing/2014/main" id="{E57EBAA1-089A-F3FF-D9E5-FF4D865DE310}"/>
-                </a:ext>
-              </a:extLst>
-            </p:cNvPr>
-            <p:cNvPicPr>
-              <a:picLocks noChangeAspect="1"/>
-            </p:cNvPicPr>
-            <p:nvPr/>
-          </p:nvPicPr>
-          <p:blipFill>
-            <a:blip r:embed="rId2"/>
-            <a:stretch>
-              <a:fillRect/>
-            </a:stretch>
-          </p:blipFill>
-          <p:spPr>
-            <a:xfrm>
-              <a:off x="4591050" y="2425700"/>
-              <a:ext cx="3009900" cy="2006600"/>
-            </a:xfrm>
-            <a:prstGeom prst="rect">
-              <a:avLst/>
-            </a:prstGeom>
-          </p:spPr>
-        </p:pic>
-        <p:sp>
-          <p:nvSpPr>
-            <p:cNvPr id="4" name="Rectangle 3">
-              <a:extLst>
-                <a:ext uri="{FF2B5EF4-FFF2-40B4-BE49-F238E27FC236}">
-                  <a16:creationId xmlns:a16="http://schemas.microsoft.com/office/drawing/2014/main" id="{E581628B-F54B-32DC-78C9-B9A81789A769}"/>
-                </a:ext>
-              </a:extLst>
-            </p:cNvPr>
-            <p:cNvSpPr/>
-            <p:nvPr/>
-          </p:nvSpPr>
-          <p:spPr>
-            <a:xfrm>
-              <a:off x="6493079" y="2425700"/>
-              <a:ext cx="1107871" cy="2006600"/>
-            </a:xfrm>
-            <a:prstGeom prst="rect">
-              <a:avLst/>
-            </a:prstGeom>
-            <a:solidFill>
-              <a:schemeClr val="bg1">
-                <a:lumMod val="85000"/>
-              </a:schemeClr>
-            </a:solidFill>
-            <a:ln>
-              <a:noFill/>
-            </a:ln>
-          </p:spPr>
-          <p:style>
-            <a:lnRef idx="2">
-              <a:schemeClr val="accent1">
-                <a:shade val="15000"/>
-              </a:schemeClr>
-            </a:lnRef>
-            <a:fillRef idx="1">
-              <a:schemeClr val="accent1"/>
-            </a:fillRef>
-            <a:effectRef idx="0">
-              <a:schemeClr val="accent1"/>
-            </a:effectRef>
-            <a:fontRef idx="minor">
-              <a:schemeClr val="lt1"/>
-            </a:fontRef>
-          </p:style>
-          <p:txBody>
-            <a:bodyPr rtlCol="0" anchor="ctr"/>
-            <a:lstStyle/>
-            <a:p>
-              <a:pPr algn="ctr"/>
-              <a:endParaRPr lang="en-US"/>
-            </a:p>
-          </p:txBody>
-        </p:sp>
-      </p:grpSp>
-      <p:pic>
-        <p:nvPicPr>
-          <p:cNvPr id="8" name="Picture 7">
-            <a:extLst>
-              <a:ext uri="{FF2B5EF4-FFF2-40B4-BE49-F238E27FC236}">
-                <a16:creationId xmlns:a16="http://schemas.microsoft.com/office/drawing/2014/main" id="{758B43D4-E9B6-5D9D-A520-8A2251393A2A}"/>
-              </a:ext>
-            </a:extLst>
-          </p:cNvPr>
-          <p:cNvPicPr>
-            <a:picLocks noChangeAspect="1"/>
-          </p:cNvPicPr>
-          <p:nvPr/>
-        </p:nvPicPr>
-        <p:blipFill>
-          <a:blip r:embed="rId3"/>
-          <a:stretch>
-            <a:fillRect/>
-          </a:stretch>
-        </p:blipFill>
-        <p:spPr>
-          <a:xfrm>
-            <a:off x="6534175" y="2928135"/>
-            <a:ext cx="1031496" cy="1040544"/>
-          </a:xfrm>
-          <a:prstGeom prst="rect">
-            <a:avLst/>
-          </a:prstGeom>
-        </p:spPr>
-      </p:pic>
-    </p:spTree>
-    <p:extLst>
-      <p:ext uri="{BB962C8B-B14F-4D97-AF65-F5344CB8AC3E}">
-        <p14:creationId xmlns:p14="http://schemas.microsoft.com/office/powerpoint/2010/main" val="1928118738"/>
-      </p:ext>
-    </p:extLst>
-  </p:cSld>
-  <p:clrMapOvr>
-    <a:masterClrMapping/>
-  </p:clrMapOvr>
-</p:sld>
-</file>
-
-<file path=ppt/slides/slide2.xml><?xml version="1.0" encoding="utf-8"?>
-<p:sld xmlns:a="http://schemas.openxmlformats.org/drawingml/2006/main" xmlns:r="http://schemas.openxmlformats.org/officeDocument/2006/relationships" xmlns:p="http://schemas.openxmlformats.org/presentationml/2006/main">
-  <p:cSld>
-    <p:spTree>
-      <p:nvGrpSpPr>
-        <p:cNvPr id="1" name=""/>
-        <p:cNvGrpSpPr/>
-        <p:nvPr/>
-      </p:nvGrpSpPr>
-      <p:grpSpPr>
-        <a:xfrm>
-          <a:off x="0" y="0"/>
-          <a:ext cx="0" cy="0"/>
-          <a:chOff x="0" y="0"/>
-          <a:chExt cx="0" cy="0"/>
-        </a:xfrm>
-      </p:grpSpPr>
-      <p:pic>
-        <p:nvPicPr>
-          <p:cNvPr id="1026" name="Picture 2" descr="The National Flag of the People’s Republic of China (“Five-star Red Flag”) features a red background with a large yellow star and four smaller stars in the upper hoist-side corner">
-            <a:extLst>
-              <a:ext uri="{FF2B5EF4-FFF2-40B4-BE49-F238E27FC236}">
-                <a16:creationId xmlns:a16="http://schemas.microsoft.com/office/drawing/2014/main" id="{EB6D59E0-4626-E7B4-F614-12A2E6291387}"/>
-              </a:ext>
-            </a:extLst>
-          </p:cNvPr>
-          <p:cNvPicPr>
-            <a:picLocks noChangeAspect="1" noChangeArrowheads="1"/>
-          </p:cNvPicPr>
-          <p:nvPr/>
-        </p:nvPicPr>
-        <p:blipFill>
-          <a:blip r:embed="rId2">
-            <a:extLst>
-              <a:ext uri="{28A0092B-C50C-407E-A947-70E740481C1C}">
-                <a14:useLocalDpi xmlns:a14="http://schemas.microsoft.com/office/drawing/2010/main" val="0"/>
-              </a:ext>
-            </a:extLst>
-          </a:blip>
-          <a:srcRect/>
-          <a:stretch>
-            <a:fillRect/>
-          </a:stretch>
-        </p:blipFill>
-        <p:spPr bwMode="auto">
-          <a:xfrm>
-            <a:off x="1643866" y="872052"/>
-            <a:ext cx="7679130" cy="5113895"/>
-          </a:xfrm>
-          <a:prstGeom prst="rect">
-            <a:avLst/>
-          </a:prstGeom>
-          <a:noFill/>
-          <a:extLst>
-            <a:ext uri="{909E8E84-426E-40DD-AFC4-6F175D3DCCD1}">
-              <a14:hiddenFill xmlns:a14="http://schemas.microsoft.com/office/drawing/2010/main">
-                <a:solidFill>
-                  <a:srgbClr val="FFFFFF"/>
-                </a:solidFill>
-              </a14:hiddenFill>
-            </a:ext>
-          </a:extLst>
-        </p:spPr>
-      </p:pic>
-    </p:spTree>
-    <p:extLst>
-      <p:ext uri="{BB962C8B-B14F-4D97-AF65-F5344CB8AC3E}">
-        <p14:creationId xmlns:p14="http://schemas.microsoft.com/office/powerpoint/2010/main" val="1645481386"/>
-      </p:ext>
-    </p:extLst>
-  </p:cSld>
-  <p:clrMapOvr>
-    <a:masterClrMapping/>
-  </p:clrMapOvr>
-</p:sld>
-</file>
-
-<file path=ppt/slides/slide3.xml><?xml version="1.0" encoding="utf-8"?>
-<p:sld xmlns:a="http://schemas.openxmlformats.org/drawingml/2006/main" xmlns:r="http://schemas.openxmlformats.org/officeDocument/2006/relationships" xmlns:p="http://schemas.openxmlformats.org/presentationml/2006/main">
-  <p:cSld>
-    <p:spTree>
-      <p:nvGrpSpPr>
-        <p:cNvPr id="1" name=""/>
-        <p:cNvGrpSpPr/>
-        <p:nvPr/>
-      </p:nvGrpSpPr>
-      <p:grpSpPr>
-        <a:xfrm>
-          <a:off x="0" y="0"/>
-          <a:ext cx="0" cy="0"/>
-          <a:chOff x="0" y="0"/>
-          <a:chExt cx="0" cy="0"/>
-        </a:xfrm>
-      </p:grpSpPr>
-      <p:grpSp>
-        <p:nvGrpSpPr>
-          <p:cNvPr id="3" name="Group 2">
-            <a:extLst>
-              <a:ext uri="{FF2B5EF4-FFF2-40B4-BE49-F238E27FC236}">
-                <a16:creationId xmlns:a16="http://schemas.microsoft.com/office/drawing/2014/main" id="{0BF56E4A-0932-0412-2FF3-FD5BB5BCC1E1}"/>
-              </a:ext>
-            </a:extLst>
-          </p:cNvPr>
-          <p:cNvGrpSpPr/>
-          <p:nvPr/>
-        </p:nvGrpSpPr>
-        <p:grpSpPr>
-          <a:xfrm>
-            <a:off x="1643866" y="872052"/>
-            <a:ext cx="8312106" cy="5113895"/>
-            <a:chOff x="1643866" y="872052"/>
-            <a:chExt cx="8312106" cy="5113895"/>
-          </a:xfrm>
-        </p:grpSpPr>
-        <p:pic>
-          <p:nvPicPr>
-            <p:cNvPr id="1026" name="Picture 2" descr="The National Flag of the People’s Republic of China (“Five-star Red Flag”) features a red background with a large yellow star and four smaller stars in the upper hoist-side corner">
-              <a:extLst>
-                <a:ext uri="{FF2B5EF4-FFF2-40B4-BE49-F238E27FC236}">
-                  <a16:creationId xmlns:a16="http://schemas.microsoft.com/office/drawing/2014/main" id="{EB6D59E0-4626-E7B4-F614-12A2E6291387}"/>
-                </a:ext>
-              </a:extLst>
-            </p:cNvPr>
-            <p:cNvPicPr>
-              <a:picLocks noChangeAspect="1" noChangeArrowheads="1"/>
-            </p:cNvPicPr>
-            <p:nvPr/>
-          </p:nvPicPr>
-          <p:blipFill>
-            <a:blip r:embed="rId2">
-              <a:extLst>
-                <a:ext uri="{28A0092B-C50C-407E-A947-70E740481C1C}">
-                  <a14:useLocalDpi xmlns:a14="http://schemas.microsoft.com/office/drawing/2010/main" val="0"/>
-                </a:ext>
-              </a:extLst>
-            </a:blip>
-            <a:srcRect/>
-            <a:stretch>
-              <a:fillRect/>
-            </a:stretch>
-          </p:blipFill>
-          <p:spPr bwMode="auto">
-            <a:xfrm>
-              <a:off x="1643866" y="872052"/>
-              <a:ext cx="7679130" cy="5113895"/>
-            </a:xfrm>
-            <a:prstGeom prst="rect">
-              <a:avLst/>
-            </a:prstGeom>
-            <a:noFill/>
-            <a:extLst>
-              <a:ext uri="{909E8E84-426E-40DD-AFC4-6F175D3DCCD1}">
-                <a14:hiddenFill xmlns:a14="http://schemas.microsoft.com/office/drawing/2010/main">
-                  <a:solidFill>
-                    <a:srgbClr val="FFFFFF"/>
-                  </a:solidFill>
-                </a14:hiddenFill>
-              </a:ext>
-            </a:extLst>
-          </p:spPr>
-        </p:pic>
-        <p:sp>
-          <p:nvSpPr>
-            <p:cNvPr id="2" name="Rectangle 1">
-              <a:extLst>
-                <a:ext uri="{FF2B5EF4-FFF2-40B4-BE49-F238E27FC236}">
-                  <a16:creationId xmlns:a16="http://schemas.microsoft.com/office/drawing/2014/main" id="{80563850-A374-A5E3-6651-FA9571E42455}"/>
-                </a:ext>
-              </a:extLst>
-            </p:cNvPr>
-            <p:cNvSpPr/>
-            <p:nvPr/>
-          </p:nvSpPr>
-          <p:spPr>
-            <a:xfrm>
-              <a:off x="6499547" y="872052"/>
-              <a:ext cx="2823450" cy="5113894"/>
-            </a:xfrm>
-            <a:prstGeom prst="rect">
-              <a:avLst/>
-            </a:prstGeom>
-            <a:solidFill>
-              <a:schemeClr val="bg1">
-                <a:lumMod val="85000"/>
-              </a:schemeClr>
-            </a:solidFill>
-            <a:ln>
-              <a:noFill/>
-            </a:ln>
-          </p:spPr>
-          <p:style>
-            <a:lnRef idx="2">
-              <a:schemeClr val="accent1">
-                <a:shade val="15000"/>
-              </a:schemeClr>
-            </a:lnRef>
-            <a:fillRef idx="1">
-              <a:schemeClr val="accent1"/>
-            </a:fillRef>
-            <a:effectRef idx="0">
-              <a:schemeClr val="accent1"/>
-            </a:effectRef>
-            <a:fontRef idx="minor">
-              <a:schemeClr val="lt1"/>
-            </a:fontRef>
-          </p:style>
-          <p:txBody>
-            <a:bodyPr rtlCol="0" anchor="ctr"/>
-            <a:lstStyle/>
-            <a:p>
-              <a:pPr algn="ctr"/>
-              <a:endParaRPr lang="en-US"/>
-            </a:p>
-          </p:txBody>
-        </p:sp>
-        <p:pic>
-          <p:nvPicPr>
-            <p:cNvPr id="1032" name="Picture 8" descr="Image result for chinese yen symbol png">
-              <a:extLst>
-                <a:ext uri="{FF2B5EF4-FFF2-40B4-BE49-F238E27FC236}">
-                  <a16:creationId xmlns:a16="http://schemas.microsoft.com/office/drawing/2014/main" id="{2356F060-F378-7259-2AEF-7466689971BA}"/>
-                </a:ext>
-              </a:extLst>
-            </p:cNvPr>
-            <p:cNvPicPr>
-              <a:picLocks noChangeAspect="1" noChangeArrowheads="1"/>
-            </p:cNvPicPr>
-            <p:nvPr/>
-          </p:nvPicPr>
-          <p:blipFill>
-            <a:blip r:embed="rId3">
-              <a:extLst>
-                <a:ext uri="{BEBA8EAE-BF5A-486C-A8C5-ECC9F3942E4B}">
-                  <a14:imgProps xmlns:a14="http://schemas.microsoft.com/office/drawing/2010/main">
-                    <a14:imgLayer r:embed="rId4">
-                      <a14:imgEffect>
-                        <a14:backgroundRemoval t="10000" b="90000" l="10000" r="90000"/>
-                      </a14:imgEffect>
-                    </a14:imgLayer>
-                  </a14:imgProps>
-                </a:ext>
-                <a:ext uri="{28A0092B-C50C-407E-A947-70E740481C1C}">
-                  <a14:useLocalDpi xmlns:a14="http://schemas.microsoft.com/office/drawing/2010/main" val="0"/>
-                </a:ext>
-              </a:extLst>
-            </a:blip>
-            <a:srcRect/>
-            <a:stretch>
-              <a:fillRect/>
-            </a:stretch>
-          </p:blipFill>
-          <p:spPr bwMode="auto">
-            <a:xfrm>
-              <a:off x="5866572" y="1142999"/>
-              <a:ext cx="4089400" cy="4572000"/>
-            </a:xfrm>
-            <a:prstGeom prst="rect">
-              <a:avLst/>
-            </a:prstGeom>
-            <a:noFill/>
-            <a:extLst>
-              <a:ext uri="{909E8E84-426E-40DD-AFC4-6F175D3DCCD1}">
-                <a14:hiddenFill xmlns:a14="http://schemas.microsoft.com/office/drawing/2010/main">
-                  <a:solidFill>
-                    <a:srgbClr val="FFFFFF"/>
-                  </a:solidFill>
-                </a14:hiddenFill>
-              </a:ext>
-            </a:extLst>
-          </p:spPr>
-        </p:pic>
-      </p:grpSp>
-    </p:spTree>
-    <p:extLst>
-      <p:ext uri="{BB962C8B-B14F-4D97-AF65-F5344CB8AC3E}">
-        <p14:creationId xmlns:p14="http://schemas.microsoft.com/office/powerpoint/2010/main" val="2180861671"/>
-      </p:ext>
-    </p:extLst>
-  </p:cSld>
-  <p:clrMapOvr>
-    <a:masterClrMapping/>
-  </p:clrMapOvr>
-</p:sld>
-</file>
-
-<file path=ppt/slides/slide4.xml><?xml version="1.0" encoding="utf-8"?>
-<p:sld xmlns:a="http://schemas.openxmlformats.org/drawingml/2006/main" xmlns:r="http://schemas.openxmlformats.org/officeDocument/2006/relationships" xmlns:p="http://schemas.openxmlformats.org/presentationml/2006/main">
-  <p:cSld>
-    <p:spTree>
-      <p:nvGrpSpPr>
-        <p:cNvPr id="1" name=""/>
-        <p:cNvGrpSpPr/>
-        <p:nvPr/>
-      </p:nvGrpSpPr>
-      <p:grpSpPr>
-        <a:xfrm>
-          <a:off x="0" y="0"/>
-          <a:ext cx="0" cy="0"/>
-          <a:chOff x="0" y="0"/>
-          <a:chExt cx="0" cy="0"/>
-        </a:xfrm>
-      </p:grpSpPr>
-      <p:grpSp>
-        <p:nvGrpSpPr>
-          <p:cNvPr id="5" name="Group 4">
-            <a:extLst>
-              <a:ext uri="{FF2B5EF4-FFF2-40B4-BE49-F238E27FC236}">
-                <a16:creationId xmlns:a16="http://schemas.microsoft.com/office/drawing/2014/main" id="{D66A11DB-DCA8-82D8-CDEA-C5B0C3694FFC}"/>
-              </a:ext>
-            </a:extLst>
-          </p:cNvPr>
-          <p:cNvGrpSpPr/>
-          <p:nvPr/>
-        </p:nvGrpSpPr>
-        <p:grpSpPr>
-          <a:xfrm>
-            <a:off x="1643866" y="872052"/>
-            <a:ext cx="7679131" cy="5113894"/>
-            <a:chOff x="1643866" y="872052"/>
-            <a:chExt cx="7679131" cy="5113894"/>
-          </a:xfrm>
-        </p:grpSpPr>
-        <p:sp>
-          <p:nvSpPr>
-            <p:cNvPr id="2" name="Rectangle 1">
-              <a:extLst>
-                <a:ext uri="{FF2B5EF4-FFF2-40B4-BE49-F238E27FC236}">
-                  <a16:creationId xmlns:a16="http://schemas.microsoft.com/office/drawing/2014/main" id="{80563850-A374-A5E3-6651-FA9571E42455}"/>
-                </a:ext>
-              </a:extLst>
-            </p:cNvPr>
-            <p:cNvSpPr/>
-            <p:nvPr/>
-          </p:nvSpPr>
-          <p:spPr>
-            <a:xfrm>
-              <a:off x="1643866" y="872052"/>
-              <a:ext cx="7679131" cy="5113894"/>
-            </a:xfrm>
-            <a:prstGeom prst="rect">
-              <a:avLst/>
-            </a:prstGeom>
-            <a:solidFill>
-              <a:schemeClr val="bg1">
-                <a:lumMod val="85000"/>
-              </a:schemeClr>
-            </a:solidFill>
-            <a:ln>
-              <a:noFill/>
-            </a:ln>
-          </p:spPr>
-          <p:style>
-            <a:lnRef idx="2">
-              <a:schemeClr val="accent1">
-                <a:shade val="15000"/>
-              </a:schemeClr>
-            </a:lnRef>
-            <a:fillRef idx="1">
-              <a:schemeClr val="accent1"/>
-            </a:fillRef>
-            <a:effectRef idx="0">
-              <a:schemeClr val="accent1"/>
-            </a:effectRef>
-            <a:fontRef idx="minor">
-              <a:schemeClr val="lt1"/>
-            </a:fontRef>
-          </p:style>
-          <p:txBody>
-            <a:bodyPr rtlCol="0" anchor="ctr"/>
-            <a:lstStyle/>
-            <a:p>
-              <a:pPr algn="ctr"/>
-              <a:endParaRPr lang="en-US"/>
-            </a:p>
-          </p:txBody>
-        </p:sp>
-        <p:sp>
-          <p:nvSpPr>
-            <p:cNvPr id="4" name="TextBox 3">
-              <a:extLst>
-                <a:ext uri="{FF2B5EF4-FFF2-40B4-BE49-F238E27FC236}">
-                  <a16:creationId xmlns:a16="http://schemas.microsoft.com/office/drawing/2014/main" id="{DFBCB9DA-BC09-8C0F-7198-3F4BAD67ADE9}"/>
-                </a:ext>
-              </a:extLst>
-            </p:cNvPr>
-            <p:cNvSpPr txBox="1"/>
-            <p:nvPr/>
-          </p:nvSpPr>
-          <p:spPr>
-            <a:xfrm>
-              <a:off x="4281355" y="1174535"/>
-              <a:ext cx="2404152" cy="4508927"/>
-            </a:xfrm>
-            <a:prstGeom prst="rect">
-              <a:avLst/>
-            </a:prstGeom>
-            <a:noFill/>
-          </p:spPr>
-          <p:txBody>
-            <a:bodyPr wrap="square" rtlCol="0">
-              <a:spAutoFit/>
-            </a:bodyPr>
-            <a:lstStyle/>
-            <a:p>
-              <a:r>
-                <a:rPr lang="en-US" sz="28700" dirty="0"/>
-                <a:t>1</a:t>
-              </a:r>
-              <a:endParaRPr lang="en-US" dirty="0"/>
-            </a:p>
-          </p:txBody>
-        </p:sp>
-      </p:grpSp>
-    </p:spTree>
-    <p:extLst>
-      <p:ext uri="{BB962C8B-B14F-4D97-AF65-F5344CB8AC3E}">
-        <p14:creationId xmlns:p14="http://schemas.microsoft.com/office/powerpoint/2010/main" val="781438344"/>
-      </p:ext>
-    </p:extLst>
-  </p:cSld>
-  <p:clrMapOvr>
-    <a:masterClrMapping/>
-  </p:clrMapOvr>
-</p:sld>
-</file>
-
-<file path=ppt/slides/slide5.xml><?xml version="1.0" encoding="utf-8"?>
-<p:sld xmlns:a="http://schemas.openxmlformats.org/drawingml/2006/main" xmlns:r="http://schemas.openxmlformats.org/officeDocument/2006/relationships" xmlns:p="http://schemas.openxmlformats.org/presentationml/2006/main">
-  <p:cSld>
-    <p:spTree>
-      <p:nvGrpSpPr>
-        <p:cNvPr id="1" name=""/>
-        <p:cNvGrpSpPr/>
-        <p:nvPr/>
-      </p:nvGrpSpPr>
-      <p:grpSpPr>
-        <a:xfrm>
-          <a:off x="0" y="0"/>
-          <a:ext cx="0" cy="0"/>
-          <a:chOff x="0" y="0"/>
-          <a:chExt cx="0" cy="0"/>
-        </a:xfrm>
-      </p:grpSpPr>
-      <p:grpSp>
-        <p:nvGrpSpPr>
-          <p:cNvPr id="11" name="Group 10">
-            <a:extLst>
-              <a:ext uri="{FF2B5EF4-FFF2-40B4-BE49-F238E27FC236}">
-                <a16:creationId xmlns:a16="http://schemas.microsoft.com/office/drawing/2014/main" id="{98BA4467-FABF-CA12-7884-DCB5FB746A49}"/>
-              </a:ext>
-            </a:extLst>
-          </p:cNvPr>
-          <p:cNvGrpSpPr/>
-          <p:nvPr/>
-        </p:nvGrpSpPr>
-        <p:grpSpPr>
-          <a:xfrm>
-            <a:off x="3359650" y="872053"/>
-            <a:ext cx="7679131" cy="5113894"/>
-            <a:chOff x="3359650" y="872053"/>
-            <a:chExt cx="7679131" cy="5113894"/>
-          </a:xfrm>
-        </p:grpSpPr>
-        <p:pic>
-          <p:nvPicPr>
-            <p:cNvPr id="10" name="Picture 9">
-              <a:extLst>
-                <a:ext uri="{FF2B5EF4-FFF2-40B4-BE49-F238E27FC236}">
-                  <a16:creationId xmlns:a16="http://schemas.microsoft.com/office/drawing/2014/main" id="{58F94A49-E6D4-7E6A-AF34-6C321E90A583}"/>
-                </a:ext>
-              </a:extLst>
-            </p:cNvPr>
-            <p:cNvPicPr>
-              <a:picLocks noChangeAspect="1"/>
-            </p:cNvPicPr>
-            <p:nvPr/>
-          </p:nvPicPr>
-          <p:blipFill>
-            <a:blip r:embed="rId2"/>
-            <a:stretch>
-              <a:fillRect/>
-            </a:stretch>
-          </p:blipFill>
-          <p:spPr>
-            <a:xfrm>
-              <a:off x="3359650" y="872053"/>
-              <a:ext cx="7679131" cy="5113894"/>
-            </a:xfrm>
-            <a:prstGeom prst="rect">
-              <a:avLst/>
-            </a:prstGeom>
-          </p:spPr>
-        </p:pic>
-        <p:pic>
-          <p:nvPicPr>
-            <p:cNvPr id="5" name="Picture 4">
-              <a:extLst>
-                <a:ext uri="{FF2B5EF4-FFF2-40B4-BE49-F238E27FC236}">
-                  <a16:creationId xmlns:a16="http://schemas.microsoft.com/office/drawing/2014/main" id="{5DFC8F26-6701-4D34-8A36-2425CFA2540F}"/>
-                </a:ext>
-              </a:extLst>
-            </p:cNvPr>
-            <p:cNvPicPr>
-              <a:picLocks noChangeAspect="1"/>
-            </p:cNvPicPr>
-            <p:nvPr/>
-          </p:nvPicPr>
-          <p:blipFill>
-            <a:blip r:embed="rId3"/>
-            <a:stretch>
-              <a:fillRect/>
-            </a:stretch>
-          </p:blipFill>
-          <p:spPr>
-            <a:xfrm>
-              <a:off x="5124519" y="1705151"/>
-              <a:ext cx="4149392" cy="3447697"/>
-            </a:xfrm>
-            <a:prstGeom prst="rect">
-              <a:avLst/>
-            </a:prstGeom>
-          </p:spPr>
-        </p:pic>
-      </p:grpSp>
-    </p:spTree>
-    <p:extLst>
-      <p:ext uri="{BB962C8B-B14F-4D97-AF65-F5344CB8AC3E}">
-        <p14:creationId xmlns:p14="http://schemas.microsoft.com/office/powerpoint/2010/main" val="443992844"/>
-      </p:ext>
-    </p:extLst>
-  </p:cSld>
-  <p:clrMapOvr>
-    <a:masterClrMapping/>
-  </p:clrMapOvr>
-</p:sld>
-</file>
-
-<file path=ppt/slides/slide6.xml><?xml version="1.0" encoding="utf-8"?>
-<p:sld xmlns:a="http://schemas.openxmlformats.org/drawingml/2006/main" xmlns:r="http://schemas.openxmlformats.org/officeDocument/2006/relationships" xmlns:p="http://schemas.openxmlformats.org/presentationml/2006/main">
-  <p:cSld>
-    <p:spTree>
-      <p:nvGrpSpPr>
-        <p:cNvPr id="1" name=""/>
-        <p:cNvGrpSpPr/>
-        <p:nvPr/>
-      </p:nvGrpSpPr>
-      <p:grpSpPr>
-        <a:xfrm>
-          <a:off x="0" y="0"/>
-          <a:ext cx="0" cy="0"/>
-          <a:chOff x="0" y="0"/>
-          <a:chExt cx="0" cy="0"/>
-        </a:xfrm>
-      </p:grpSpPr>
-      <p:grpSp>
-        <p:nvGrpSpPr>
-          <p:cNvPr id="4" name="Group 3">
-            <a:extLst>
-              <a:ext uri="{FF2B5EF4-FFF2-40B4-BE49-F238E27FC236}">
-                <a16:creationId xmlns:a16="http://schemas.microsoft.com/office/drawing/2014/main" id="{3540DCA3-7DDB-851D-2AE0-0008D75826E5}"/>
-              </a:ext>
-            </a:extLst>
-          </p:cNvPr>
-          <p:cNvGrpSpPr/>
-          <p:nvPr/>
-        </p:nvGrpSpPr>
-        <p:grpSpPr>
-          <a:xfrm>
-            <a:off x="3359650" y="872053"/>
-            <a:ext cx="7679131" cy="5113894"/>
-            <a:chOff x="3359650" y="872053"/>
-            <a:chExt cx="7679131" cy="5113894"/>
-          </a:xfrm>
-        </p:grpSpPr>
-        <p:pic>
-          <p:nvPicPr>
-            <p:cNvPr id="10" name="Picture 9">
-              <a:extLst>
-                <a:ext uri="{FF2B5EF4-FFF2-40B4-BE49-F238E27FC236}">
-                  <a16:creationId xmlns:a16="http://schemas.microsoft.com/office/drawing/2014/main" id="{58F94A49-E6D4-7E6A-AF34-6C321E90A583}"/>
-                </a:ext>
-              </a:extLst>
-            </p:cNvPr>
-            <p:cNvPicPr>
-              <a:picLocks noChangeAspect="1"/>
-            </p:cNvPicPr>
-            <p:nvPr/>
-          </p:nvPicPr>
-          <p:blipFill>
-            <a:blip r:embed="rId2"/>
-            <a:stretch>
-              <a:fillRect/>
-            </a:stretch>
-          </p:blipFill>
-          <p:spPr>
-            <a:xfrm>
-              <a:off x="3359650" y="872053"/>
-              <a:ext cx="7679131" cy="5113894"/>
-            </a:xfrm>
-            <a:prstGeom prst="rect">
-              <a:avLst/>
-            </a:prstGeom>
-          </p:spPr>
-        </p:pic>
-        <p:sp>
-          <p:nvSpPr>
-            <p:cNvPr id="3" name="TextBox 2">
-              <a:extLst>
-                <a:ext uri="{FF2B5EF4-FFF2-40B4-BE49-F238E27FC236}">
-                  <a16:creationId xmlns:a16="http://schemas.microsoft.com/office/drawing/2014/main" id="{DE769EB3-976B-8DAD-FE40-C4B38E36104E}"/>
-                </a:ext>
-              </a:extLst>
-            </p:cNvPr>
-            <p:cNvSpPr txBox="1"/>
-            <p:nvPr/>
-          </p:nvSpPr>
-          <p:spPr>
-            <a:xfrm>
-              <a:off x="3438875" y="1448651"/>
-              <a:ext cx="7492828" cy="4508927"/>
-            </a:xfrm>
-            <a:prstGeom prst="rect">
-              <a:avLst/>
-            </a:prstGeom>
-            <a:noFill/>
-          </p:spPr>
-          <p:txBody>
-            <a:bodyPr wrap="square" rtlCol="0">
-              <a:spAutoFit/>
-            </a:bodyPr>
-            <a:lstStyle/>
-            <a:p>
-              <a:pPr algn="ctr"/>
-              <a:r>
-                <a:rPr lang="en-US" sz="28700" dirty="0">
-                  <a:solidFill>
-                    <a:schemeClr val="bg1"/>
-                  </a:solidFill>
-                  <a:effectLst/>
-                  <a:latin typeface="Menlo" panose="020B0609030804020204" pitchFamily="49" charset="0"/>
-                </a:rPr>
-                <a:t>٣</a:t>
-              </a:r>
-              <a:endParaRPr lang="en-US" sz="2000" dirty="0">
-                <a:solidFill>
-                  <a:schemeClr val="bg1"/>
-                </a:solidFill>
-                <a:effectLst/>
-                <a:latin typeface="Menlo" panose="020B0609030804020204" pitchFamily="49" charset="0"/>
-              </a:endParaRPr>
-            </a:p>
-          </p:txBody>
-        </p:sp>
-      </p:grpSp>
-    </p:spTree>
-    <p:extLst>
-      <p:ext uri="{BB962C8B-B14F-4D97-AF65-F5344CB8AC3E}">
-        <p14:creationId xmlns:p14="http://schemas.microsoft.com/office/powerpoint/2010/main" val="564751667"/>
-      </p:ext>
-    </p:extLst>
-  </p:cSld>
-  <p:clrMapOvr>
-    <a:masterClrMapping/>
-  </p:clrMapOvr>
-</p:sld>
-</file>
-
-<file path=ppt/slides/slide7.xml><?xml version="1.0" encoding="utf-8"?>
-<p:sld xmlns:a="http://schemas.openxmlformats.org/drawingml/2006/main" xmlns:r="http://schemas.openxmlformats.org/officeDocument/2006/relationships" xmlns:p="http://schemas.openxmlformats.org/presentationml/2006/main">
-  <p:cSld>
-    <p:spTree>
-      <p:nvGrpSpPr>
-        <p:cNvPr id="1" name=""/>
-        <p:cNvGrpSpPr/>
-        <p:nvPr/>
-      </p:nvGrpSpPr>
-      <p:grpSpPr>
-        <a:xfrm>
-          <a:off x="0" y="0"/>
-          <a:ext cx="0" cy="0"/>
-          <a:chOff x="0" y="0"/>
-          <a:chExt cx="0" cy="0"/>
-        </a:xfrm>
-      </p:grpSpPr>
-      <p:pic>
-        <p:nvPicPr>
-          <p:cNvPr id="3" name="Picture 2">
-            <a:extLst>
-              <a:ext uri="{FF2B5EF4-FFF2-40B4-BE49-F238E27FC236}">
-                <a16:creationId xmlns:a16="http://schemas.microsoft.com/office/drawing/2014/main" id="{122BA71B-D526-50BC-1578-0C3CC3DF9BEA}"/>
-              </a:ext>
-            </a:extLst>
-          </p:cNvPr>
-          <p:cNvPicPr>
-            <a:picLocks noChangeAspect="1"/>
-          </p:cNvPicPr>
-          <p:nvPr/>
-        </p:nvPicPr>
-        <p:blipFill>
-          <a:blip r:embed="rId2"/>
-          <a:stretch>
-            <a:fillRect/>
-          </a:stretch>
-        </p:blipFill>
-        <p:spPr>
-          <a:xfrm>
-            <a:off x="3973316" y="2028075"/>
-            <a:ext cx="3228868" cy="2122684"/>
-          </a:xfrm>
-          <a:prstGeom prst="rect">
-            <a:avLst/>
-          </a:prstGeom>
-        </p:spPr>
-      </p:pic>
-      <p:sp>
-        <p:nvSpPr>
-          <p:cNvPr id="13" name="Rectangle 12">
-            <a:extLst>
-              <a:ext uri="{FF2B5EF4-FFF2-40B4-BE49-F238E27FC236}">
-                <a16:creationId xmlns:a16="http://schemas.microsoft.com/office/drawing/2014/main" id="{87E21DAD-2838-575D-B584-E8B882F72C2B}"/>
-              </a:ext>
-            </a:extLst>
-          </p:cNvPr>
-          <p:cNvSpPr/>
-          <p:nvPr/>
-        </p:nvSpPr>
-        <p:spPr>
-          <a:xfrm>
-            <a:off x="6096000" y="2028075"/>
-            <a:ext cx="1188468" cy="2122684"/>
-          </a:xfrm>
-          <a:prstGeom prst="rect">
-            <a:avLst/>
-          </a:prstGeom>
-          <a:solidFill>
-            <a:schemeClr val="bg1">
-              <a:lumMod val="85000"/>
-            </a:schemeClr>
-          </a:solidFill>
-          <a:ln>
-            <a:noFill/>
-          </a:ln>
-        </p:spPr>
-        <p:style>
-          <a:lnRef idx="2">
-            <a:schemeClr val="accent1">
-              <a:shade val="15000"/>
-            </a:schemeClr>
-          </a:lnRef>
-          <a:fillRef idx="1">
-            <a:schemeClr val="accent1"/>
-          </a:fillRef>
-          <a:effectRef idx="0">
-            <a:schemeClr val="accent1"/>
-          </a:effectRef>
-          <a:fontRef idx="minor">
-            <a:schemeClr val="lt1"/>
-          </a:fontRef>
-        </p:style>
-        <p:txBody>
-          <a:bodyPr wrap="none" lIns="0" tIns="0" rIns="0" bIns="0" rtlCol="0" anchor="ctr"/>
-          <a:lstStyle/>
-          <a:p>
-            <a:pPr algn="ctr"/>
-            <a:endParaRPr lang="en-US"/>
-          </a:p>
-        </p:txBody>
-      </p:sp>
-      <p:sp>
-        <p:nvSpPr>
-          <p:cNvPr id="14" name="TextBox 13">
-            <a:extLst>
-              <a:ext uri="{FF2B5EF4-FFF2-40B4-BE49-F238E27FC236}">
-                <a16:creationId xmlns:a16="http://schemas.microsoft.com/office/drawing/2014/main" id="{5089EA09-0A1C-B8CE-6E85-4046182C33B9}"/>
-              </a:ext>
-            </a:extLst>
-          </p:cNvPr>
-          <p:cNvSpPr txBox="1"/>
-          <p:nvPr/>
-        </p:nvSpPr>
-        <p:spPr>
-          <a:xfrm>
-            <a:off x="6291299" y="2352781"/>
-            <a:ext cx="815929" cy="1354217"/>
-          </a:xfrm>
-          <a:prstGeom prst="rect">
-            <a:avLst/>
-          </a:prstGeom>
-          <a:noFill/>
-        </p:spPr>
-        <p:txBody>
-          <a:bodyPr wrap="none" lIns="0" tIns="0" rIns="0" bIns="0" rtlCol="0">
-            <a:spAutoFit/>
-          </a:bodyPr>
-          <a:lstStyle/>
-          <a:p>
-            <a:r>
-              <a:rPr lang="hy-AM" sz="8800" b="0" i="0" dirty="0">
-                <a:solidFill>
-                  <a:srgbClr val="202122"/>
-                </a:solidFill>
-                <a:effectLst/>
-                <a:latin typeface="Arial" panose="020B0604020202020204" pitchFamily="34" charset="0"/>
-              </a:rPr>
-              <a:t>Ա</a:t>
-            </a:r>
-            <a:endParaRPr lang="en-US" dirty="0"/>
-          </a:p>
-        </p:txBody>
-      </p:sp>
-    </p:spTree>
-    <p:extLst>
-      <p:ext uri="{BB962C8B-B14F-4D97-AF65-F5344CB8AC3E}">
-        <p14:creationId xmlns:p14="http://schemas.microsoft.com/office/powerpoint/2010/main" val="2704576843"/>
-      </p:ext>
-    </p:extLst>
-  </p:cSld>
-  <p:clrMapOvr>
-    <a:masterClrMapping/>
-  </p:clrMapOvr>
-</p:sld>
-</file>
-
-<file path=ppt/slides/slide8.xml><?xml version="1.0" encoding="utf-8"?>
-<p:sld xmlns:a="http://schemas.openxmlformats.org/drawingml/2006/main" xmlns:r="http://schemas.openxmlformats.org/officeDocument/2006/relationships" xmlns:p="http://schemas.openxmlformats.org/presentationml/2006/main">
-  <p:cSld>
-    <p:spTree>
-      <p:nvGrpSpPr>
-        <p:cNvPr id="1" name=""/>
-        <p:cNvGrpSpPr/>
-        <p:nvPr/>
-      </p:nvGrpSpPr>
-      <p:grpSpPr>
-        <a:xfrm>
-          <a:off x="0" y="0"/>
-          <a:ext cx="0" cy="0"/>
-          <a:chOff x="0" y="0"/>
-          <a:chExt cx="0" cy="0"/>
-        </a:xfrm>
-      </p:grpSpPr>
-      <p:grpSp>
-        <p:nvGrpSpPr>
           <p:cNvPr id="26" name="Group 25">
             <a:extLst>
               <a:ext uri="{FF2B5EF4-FFF2-40B4-BE49-F238E27FC236}">
@@ -6296,7 +5310,7 @@
 </p:sld>
 </file>
 
-<file path=ppt/slides/slide9.xml><?xml version="1.0" encoding="utf-8"?>
+<file path=ppt/slides/slide11.xml><?xml version="1.0" encoding="utf-8"?>
 <p:sld xmlns:a="http://schemas.openxmlformats.org/drawingml/2006/main" xmlns:r="http://schemas.openxmlformats.org/officeDocument/2006/relationships" xmlns:p="http://schemas.openxmlformats.org/presentationml/2006/main">
   <p:cSld>
     <p:spTree>
@@ -6400,6 +5414,1125 @@
     <p:extLst>
       <p:ext uri="{BB962C8B-B14F-4D97-AF65-F5344CB8AC3E}">
         <p14:creationId xmlns:p14="http://schemas.microsoft.com/office/powerpoint/2010/main" val="2268150417"/>
+      </p:ext>
+    </p:extLst>
+  </p:cSld>
+  <p:clrMapOvr>
+    <a:masterClrMapping/>
+  </p:clrMapOvr>
+</p:sld>
+</file>
+
+<file path=ppt/slides/slide12.xml><?xml version="1.0" encoding="utf-8"?>
+<p:sld xmlns:a="http://schemas.openxmlformats.org/drawingml/2006/main" xmlns:r="http://schemas.openxmlformats.org/officeDocument/2006/relationships" xmlns:p="http://schemas.openxmlformats.org/presentationml/2006/main">
+  <p:cSld>
+    <p:spTree>
+      <p:nvGrpSpPr>
+        <p:cNvPr id="1" name=""/>
+        <p:cNvGrpSpPr/>
+        <p:nvPr/>
+      </p:nvGrpSpPr>
+      <p:grpSpPr>
+        <a:xfrm>
+          <a:off x="0" y="0"/>
+          <a:ext cx="0" cy="0"/>
+          <a:chOff x="0" y="0"/>
+          <a:chExt cx="0" cy="0"/>
+        </a:xfrm>
+      </p:grpSpPr>
+      <p:grpSp>
+        <p:nvGrpSpPr>
+          <p:cNvPr id="2" name="Group 1">
+            <a:extLst>
+              <a:ext uri="{FF2B5EF4-FFF2-40B4-BE49-F238E27FC236}">
+                <a16:creationId xmlns:a16="http://schemas.microsoft.com/office/drawing/2014/main" id="{BF4BEEF5-D775-1826-A760-CF76CA0E3BDB}"/>
+              </a:ext>
+            </a:extLst>
+          </p:cNvPr>
+          <p:cNvGrpSpPr/>
+          <p:nvPr/>
+        </p:nvGrpSpPr>
+        <p:grpSpPr>
+          <a:xfrm>
+            <a:off x="4591050" y="2425700"/>
+            <a:ext cx="3009900" cy="2006600"/>
+            <a:chOff x="4591050" y="2425700"/>
+            <a:chExt cx="3009900" cy="2006600"/>
+          </a:xfrm>
+        </p:grpSpPr>
+        <p:pic>
+          <p:nvPicPr>
+            <p:cNvPr id="3" name="Picture 2">
+              <a:extLst>
+                <a:ext uri="{FF2B5EF4-FFF2-40B4-BE49-F238E27FC236}">
+                  <a16:creationId xmlns:a16="http://schemas.microsoft.com/office/drawing/2014/main" id="{E57EBAA1-089A-F3FF-D9E5-FF4D865DE310}"/>
+                </a:ext>
+              </a:extLst>
+            </p:cNvPr>
+            <p:cNvPicPr>
+              <a:picLocks noChangeAspect="1"/>
+            </p:cNvPicPr>
+            <p:nvPr/>
+          </p:nvPicPr>
+          <p:blipFill>
+            <a:blip r:embed="rId2"/>
+            <a:stretch>
+              <a:fillRect/>
+            </a:stretch>
+          </p:blipFill>
+          <p:spPr>
+            <a:xfrm>
+              <a:off x="4591050" y="2425700"/>
+              <a:ext cx="3009900" cy="2006600"/>
+            </a:xfrm>
+            <a:prstGeom prst="rect">
+              <a:avLst/>
+            </a:prstGeom>
+          </p:spPr>
+        </p:pic>
+        <p:sp>
+          <p:nvSpPr>
+            <p:cNvPr id="4" name="Rectangle 3">
+              <a:extLst>
+                <a:ext uri="{FF2B5EF4-FFF2-40B4-BE49-F238E27FC236}">
+                  <a16:creationId xmlns:a16="http://schemas.microsoft.com/office/drawing/2014/main" id="{E581628B-F54B-32DC-78C9-B9A81789A769}"/>
+                </a:ext>
+              </a:extLst>
+            </p:cNvPr>
+            <p:cNvSpPr/>
+            <p:nvPr/>
+          </p:nvSpPr>
+          <p:spPr>
+            <a:xfrm>
+              <a:off x="6493079" y="2425700"/>
+              <a:ext cx="1107871" cy="2006600"/>
+            </a:xfrm>
+            <a:prstGeom prst="rect">
+              <a:avLst/>
+            </a:prstGeom>
+            <a:solidFill>
+              <a:schemeClr val="bg1">
+                <a:lumMod val="85000"/>
+              </a:schemeClr>
+            </a:solidFill>
+            <a:ln>
+              <a:noFill/>
+            </a:ln>
+          </p:spPr>
+          <p:style>
+            <a:lnRef idx="2">
+              <a:schemeClr val="accent1">
+                <a:shade val="15000"/>
+              </a:schemeClr>
+            </a:lnRef>
+            <a:fillRef idx="1">
+              <a:schemeClr val="accent1"/>
+            </a:fillRef>
+            <a:effectRef idx="0">
+              <a:schemeClr val="accent1"/>
+            </a:effectRef>
+            <a:fontRef idx="minor">
+              <a:schemeClr val="lt1"/>
+            </a:fontRef>
+          </p:style>
+          <p:txBody>
+            <a:bodyPr rtlCol="0" anchor="ctr"/>
+            <a:lstStyle/>
+            <a:p>
+              <a:pPr algn="ctr"/>
+              <a:endParaRPr lang="en-US"/>
+            </a:p>
+          </p:txBody>
+        </p:sp>
+      </p:grpSp>
+      <p:pic>
+        <p:nvPicPr>
+          <p:cNvPr id="8" name="Picture 7">
+            <a:extLst>
+              <a:ext uri="{FF2B5EF4-FFF2-40B4-BE49-F238E27FC236}">
+                <a16:creationId xmlns:a16="http://schemas.microsoft.com/office/drawing/2014/main" id="{758B43D4-E9B6-5D9D-A520-8A2251393A2A}"/>
+              </a:ext>
+            </a:extLst>
+          </p:cNvPr>
+          <p:cNvPicPr>
+            <a:picLocks noChangeAspect="1"/>
+          </p:cNvPicPr>
+          <p:nvPr/>
+        </p:nvPicPr>
+        <p:blipFill>
+          <a:blip r:embed="rId3"/>
+          <a:stretch>
+            <a:fillRect/>
+          </a:stretch>
+        </p:blipFill>
+        <p:spPr>
+          <a:xfrm>
+            <a:off x="6534175" y="2928135"/>
+            <a:ext cx="1031496" cy="1040544"/>
+          </a:xfrm>
+          <a:prstGeom prst="rect">
+            <a:avLst/>
+          </a:prstGeom>
+        </p:spPr>
+      </p:pic>
+    </p:spTree>
+    <p:extLst>
+      <p:ext uri="{BB962C8B-B14F-4D97-AF65-F5344CB8AC3E}">
+        <p14:creationId xmlns:p14="http://schemas.microsoft.com/office/powerpoint/2010/main" val="1928118738"/>
+      </p:ext>
+    </p:extLst>
+  </p:cSld>
+  <p:clrMapOvr>
+    <a:masterClrMapping/>
+  </p:clrMapOvr>
+</p:sld>
+</file>
+
+<file path=ppt/slides/slide2.xml><?xml version="1.0" encoding="utf-8"?>
+<p:sld xmlns:a="http://schemas.openxmlformats.org/drawingml/2006/main" xmlns:r="http://schemas.openxmlformats.org/officeDocument/2006/relationships" xmlns:p="http://schemas.openxmlformats.org/presentationml/2006/main">
+  <p:cSld>
+    <p:spTree>
+      <p:nvGrpSpPr>
+        <p:cNvPr id="1" name=""/>
+        <p:cNvGrpSpPr/>
+        <p:nvPr/>
+      </p:nvGrpSpPr>
+      <p:grpSpPr>
+        <a:xfrm>
+          <a:off x="0" y="0"/>
+          <a:ext cx="0" cy="0"/>
+          <a:chOff x="0" y="0"/>
+          <a:chExt cx="0" cy="0"/>
+        </a:xfrm>
+      </p:grpSpPr>
+      <p:pic>
+        <p:nvPicPr>
+          <p:cNvPr id="1026" name="Picture 2" descr="The National Flag of the People’s Republic of China (“Five-star Red Flag”) features a red background with a large yellow star and four smaller stars in the upper hoist-side corner">
+            <a:extLst>
+              <a:ext uri="{FF2B5EF4-FFF2-40B4-BE49-F238E27FC236}">
+                <a16:creationId xmlns:a16="http://schemas.microsoft.com/office/drawing/2014/main" id="{EB6D59E0-4626-E7B4-F614-12A2E6291387}"/>
+              </a:ext>
+            </a:extLst>
+          </p:cNvPr>
+          <p:cNvPicPr>
+            <a:picLocks noChangeAspect="1" noChangeArrowheads="1"/>
+          </p:cNvPicPr>
+          <p:nvPr/>
+        </p:nvPicPr>
+        <p:blipFill>
+          <a:blip r:embed="rId2">
+            <a:extLst>
+              <a:ext uri="{28A0092B-C50C-407E-A947-70E740481C1C}">
+                <a14:useLocalDpi xmlns:a14="http://schemas.microsoft.com/office/drawing/2010/main" val="0"/>
+              </a:ext>
+            </a:extLst>
+          </a:blip>
+          <a:srcRect/>
+          <a:stretch>
+            <a:fillRect/>
+          </a:stretch>
+        </p:blipFill>
+        <p:spPr bwMode="auto">
+          <a:xfrm>
+            <a:off x="1643866" y="872052"/>
+            <a:ext cx="7679130" cy="5113895"/>
+          </a:xfrm>
+          <a:prstGeom prst="rect">
+            <a:avLst/>
+          </a:prstGeom>
+          <a:noFill/>
+          <a:extLst>
+            <a:ext uri="{909E8E84-426E-40DD-AFC4-6F175D3DCCD1}">
+              <a14:hiddenFill xmlns:a14="http://schemas.microsoft.com/office/drawing/2010/main">
+                <a:solidFill>
+                  <a:srgbClr val="FFFFFF"/>
+                </a:solidFill>
+              </a14:hiddenFill>
+            </a:ext>
+          </a:extLst>
+        </p:spPr>
+      </p:pic>
+    </p:spTree>
+    <p:extLst>
+      <p:ext uri="{BB962C8B-B14F-4D97-AF65-F5344CB8AC3E}">
+        <p14:creationId xmlns:p14="http://schemas.microsoft.com/office/powerpoint/2010/main" val="1645481386"/>
+      </p:ext>
+    </p:extLst>
+  </p:cSld>
+  <p:clrMapOvr>
+    <a:masterClrMapping/>
+  </p:clrMapOvr>
+</p:sld>
+</file>
+
+<file path=ppt/slides/slide3.xml><?xml version="1.0" encoding="utf-8"?>
+<p:sld xmlns:a="http://schemas.openxmlformats.org/drawingml/2006/main" xmlns:r="http://schemas.openxmlformats.org/officeDocument/2006/relationships" xmlns:p="http://schemas.openxmlformats.org/presentationml/2006/main">
+  <p:cSld>
+    <p:spTree>
+      <p:nvGrpSpPr>
+        <p:cNvPr id="1" name=""/>
+        <p:cNvGrpSpPr/>
+        <p:nvPr/>
+      </p:nvGrpSpPr>
+      <p:grpSpPr>
+        <a:xfrm>
+          <a:off x="0" y="0"/>
+          <a:ext cx="0" cy="0"/>
+          <a:chOff x="0" y="0"/>
+          <a:chExt cx="0" cy="0"/>
+        </a:xfrm>
+      </p:grpSpPr>
+      <p:grpSp>
+        <p:nvGrpSpPr>
+          <p:cNvPr id="3" name="Group 2">
+            <a:extLst>
+              <a:ext uri="{FF2B5EF4-FFF2-40B4-BE49-F238E27FC236}">
+                <a16:creationId xmlns:a16="http://schemas.microsoft.com/office/drawing/2014/main" id="{0BF56E4A-0932-0412-2FF3-FD5BB5BCC1E1}"/>
+              </a:ext>
+            </a:extLst>
+          </p:cNvPr>
+          <p:cNvGrpSpPr/>
+          <p:nvPr/>
+        </p:nvGrpSpPr>
+        <p:grpSpPr>
+          <a:xfrm>
+            <a:off x="1643866" y="872052"/>
+            <a:ext cx="8312106" cy="5113895"/>
+            <a:chOff x="1643866" y="872052"/>
+            <a:chExt cx="8312106" cy="5113895"/>
+          </a:xfrm>
+        </p:grpSpPr>
+        <p:pic>
+          <p:nvPicPr>
+            <p:cNvPr id="1026" name="Picture 2" descr="The National Flag of the People’s Republic of China (“Five-star Red Flag”) features a red background with a large yellow star and four smaller stars in the upper hoist-side corner">
+              <a:extLst>
+                <a:ext uri="{FF2B5EF4-FFF2-40B4-BE49-F238E27FC236}">
+                  <a16:creationId xmlns:a16="http://schemas.microsoft.com/office/drawing/2014/main" id="{EB6D59E0-4626-E7B4-F614-12A2E6291387}"/>
+                </a:ext>
+              </a:extLst>
+            </p:cNvPr>
+            <p:cNvPicPr>
+              <a:picLocks noChangeAspect="1" noChangeArrowheads="1"/>
+            </p:cNvPicPr>
+            <p:nvPr/>
+          </p:nvPicPr>
+          <p:blipFill>
+            <a:blip r:embed="rId2">
+              <a:extLst>
+                <a:ext uri="{28A0092B-C50C-407E-A947-70E740481C1C}">
+                  <a14:useLocalDpi xmlns:a14="http://schemas.microsoft.com/office/drawing/2010/main" val="0"/>
+                </a:ext>
+              </a:extLst>
+            </a:blip>
+            <a:srcRect/>
+            <a:stretch>
+              <a:fillRect/>
+            </a:stretch>
+          </p:blipFill>
+          <p:spPr bwMode="auto">
+            <a:xfrm>
+              <a:off x="1643866" y="872052"/>
+              <a:ext cx="7679130" cy="5113895"/>
+            </a:xfrm>
+            <a:prstGeom prst="rect">
+              <a:avLst/>
+            </a:prstGeom>
+            <a:noFill/>
+            <a:extLst>
+              <a:ext uri="{909E8E84-426E-40DD-AFC4-6F175D3DCCD1}">
+                <a14:hiddenFill xmlns:a14="http://schemas.microsoft.com/office/drawing/2010/main">
+                  <a:solidFill>
+                    <a:srgbClr val="FFFFFF"/>
+                  </a:solidFill>
+                </a14:hiddenFill>
+              </a:ext>
+            </a:extLst>
+          </p:spPr>
+        </p:pic>
+        <p:sp>
+          <p:nvSpPr>
+            <p:cNvPr id="2" name="Rectangle 1">
+              <a:extLst>
+                <a:ext uri="{FF2B5EF4-FFF2-40B4-BE49-F238E27FC236}">
+                  <a16:creationId xmlns:a16="http://schemas.microsoft.com/office/drawing/2014/main" id="{80563850-A374-A5E3-6651-FA9571E42455}"/>
+                </a:ext>
+              </a:extLst>
+            </p:cNvPr>
+            <p:cNvSpPr/>
+            <p:nvPr/>
+          </p:nvSpPr>
+          <p:spPr>
+            <a:xfrm>
+              <a:off x="6499547" y="872052"/>
+              <a:ext cx="2823450" cy="5113894"/>
+            </a:xfrm>
+            <a:prstGeom prst="rect">
+              <a:avLst/>
+            </a:prstGeom>
+            <a:solidFill>
+              <a:schemeClr val="bg1">
+                <a:lumMod val="85000"/>
+              </a:schemeClr>
+            </a:solidFill>
+            <a:ln>
+              <a:noFill/>
+            </a:ln>
+          </p:spPr>
+          <p:style>
+            <a:lnRef idx="2">
+              <a:schemeClr val="accent1">
+                <a:shade val="15000"/>
+              </a:schemeClr>
+            </a:lnRef>
+            <a:fillRef idx="1">
+              <a:schemeClr val="accent1"/>
+            </a:fillRef>
+            <a:effectRef idx="0">
+              <a:schemeClr val="accent1"/>
+            </a:effectRef>
+            <a:fontRef idx="minor">
+              <a:schemeClr val="lt1"/>
+            </a:fontRef>
+          </p:style>
+          <p:txBody>
+            <a:bodyPr rtlCol="0" anchor="ctr"/>
+            <a:lstStyle/>
+            <a:p>
+              <a:pPr algn="ctr"/>
+              <a:endParaRPr lang="en-US"/>
+            </a:p>
+          </p:txBody>
+        </p:sp>
+        <p:pic>
+          <p:nvPicPr>
+            <p:cNvPr id="1032" name="Picture 8" descr="Image result for chinese yen symbol png">
+              <a:extLst>
+                <a:ext uri="{FF2B5EF4-FFF2-40B4-BE49-F238E27FC236}">
+                  <a16:creationId xmlns:a16="http://schemas.microsoft.com/office/drawing/2014/main" id="{2356F060-F378-7259-2AEF-7466689971BA}"/>
+                </a:ext>
+              </a:extLst>
+            </p:cNvPr>
+            <p:cNvPicPr>
+              <a:picLocks noChangeAspect="1" noChangeArrowheads="1"/>
+            </p:cNvPicPr>
+            <p:nvPr/>
+          </p:nvPicPr>
+          <p:blipFill>
+            <a:blip r:embed="rId3">
+              <a:extLst>
+                <a:ext uri="{BEBA8EAE-BF5A-486C-A8C5-ECC9F3942E4B}">
+                  <a14:imgProps xmlns:a14="http://schemas.microsoft.com/office/drawing/2010/main">
+                    <a14:imgLayer r:embed="rId4">
+                      <a14:imgEffect>
+                        <a14:backgroundRemoval t="10000" b="90000" l="10000" r="90000"/>
+                      </a14:imgEffect>
+                    </a14:imgLayer>
+                  </a14:imgProps>
+                </a:ext>
+                <a:ext uri="{28A0092B-C50C-407E-A947-70E740481C1C}">
+                  <a14:useLocalDpi xmlns:a14="http://schemas.microsoft.com/office/drawing/2010/main" val="0"/>
+                </a:ext>
+              </a:extLst>
+            </a:blip>
+            <a:srcRect/>
+            <a:stretch>
+              <a:fillRect/>
+            </a:stretch>
+          </p:blipFill>
+          <p:spPr bwMode="auto">
+            <a:xfrm>
+              <a:off x="5866572" y="1142999"/>
+              <a:ext cx="4089400" cy="4572000"/>
+            </a:xfrm>
+            <a:prstGeom prst="rect">
+              <a:avLst/>
+            </a:prstGeom>
+            <a:noFill/>
+            <a:extLst>
+              <a:ext uri="{909E8E84-426E-40DD-AFC4-6F175D3DCCD1}">
+                <a14:hiddenFill xmlns:a14="http://schemas.microsoft.com/office/drawing/2010/main">
+                  <a:solidFill>
+                    <a:srgbClr val="FFFFFF"/>
+                  </a:solidFill>
+                </a14:hiddenFill>
+              </a:ext>
+            </a:extLst>
+          </p:spPr>
+        </p:pic>
+      </p:grpSp>
+    </p:spTree>
+    <p:extLst>
+      <p:ext uri="{BB962C8B-B14F-4D97-AF65-F5344CB8AC3E}">
+        <p14:creationId xmlns:p14="http://schemas.microsoft.com/office/powerpoint/2010/main" val="2180861671"/>
+      </p:ext>
+    </p:extLst>
+  </p:cSld>
+  <p:clrMapOvr>
+    <a:masterClrMapping/>
+  </p:clrMapOvr>
+</p:sld>
+</file>
+
+<file path=ppt/slides/slide4.xml><?xml version="1.0" encoding="utf-8"?>
+<p:sld xmlns:a="http://schemas.openxmlformats.org/drawingml/2006/main" xmlns:r="http://schemas.openxmlformats.org/officeDocument/2006/relationships" xmlns:p="http://schemas.openxmlformats.org/presentationml/2006/main">
+  <p:cSld>
+    <p:spTree>
+      <p:nvGrpSpPr>
+        <p:cNvPr id="1" name=""/>
+        <p:cNvGrpSpPr/>
+        <p:nvPr/>
+      </p:nvGrpSpPr>
+      <p:grpSpPr>
+        <a:xfrm>
+          <a:off x="0" y="0"/>
+          <a:ext cx="0" cy="0"/>
+          <a:chOff x="0" y="0"/>
+          <a:chExt cx="0" cy="0"/>
+        </a:xfrm>
+      </p:grpSpPr>
+      <p:grpSp>
+        <p:nvGrpSpPr>
+          <p:cNvPr id="5" name="Group 4">
+            <a:extLst>
+              <a:ext uri="{FF2B5EF4-FFF2-40B4-BE49-F238E27FC236}">
+                <a16:creationId xmlns:a16="http://schemas.microsoft.com/office/drawing/2014/main" id="{D66A11DB-DCA8-82D8-CDEA-C5B0C3694FFC}"/>
+              </a:ext>
+            </a:extLst>
+          </p:cNvPr>
+          <p:cNvGrpSpPr/>
+          <p:nvPr/>
+        </p:nvGrpSpPr>
+        <p:grpSpPr>
+          <a:xfrm>
+            <a:off x="1643866" y="872052"/>
+            <a:ext cx="7679131" cy="5113894"/>
+            <a:chOff x="1643866" y="872052"/>
+            <a:chExt cx="7679131" cy="5113894"/>
+          </a:xfrm>
+        </p:grpSpPr>
+        <p:sp>
+          <p:nvSpPr>
+            <p:cNvPr id="2" name="Rectangle 1">
+              <a:extLst>
+                <a:ext uri="{FF2B5EF4-FFF2-40B4-BE49-F238E27FC236}">
+                  <a16:creationId xmlns:a16="http://schemas.microsoft.com/office/drawing/2014/main" id="{80563850-A374-A5E3-6651-FA9571E42455}"/>
+                </a:ext>
+              </a:extLst>
+            </p:cNvPr>
+            <p:cNvSpPr/>
+            <p:nvPr/>
+          </p:nvSpPr>
+          <p:spPr>
+            <a:xfrm>
+              <a:off x="1643866" y="872052"/>
+              <a:ext cx="7679131" cy="5113894"/>
+            </a:xfrm>
+            <a:prstGeom prst="rect">
+              <a:avLst/>
+            </a:prstGeom>
+            <a:solidFill>
+              <a:schemeClr val="bg1">
+                <a:lumMod val="85000"/>
+              </a:schemeClr>
+            </a:solidFill>
+            <a:ln>
+              <a:noFill/>
+            </a:ln>
+          </p:spPr>
+          <p:style>
+            <a:lnRef idx="2">
+              <a:schemeClr val="accent1">
+                <a:shade val="15000"/>
+              </a:schemeClr>
+            </a:lnRef>
+            <a:fillRef idx="1">
+              <a:schemeClr val="accent1"/>
+            </a:fillRef>
+            <a:effectRef idx="0">
+              <a:schemeClr val="accent1"/>
+            </a:effectRef>
+            <a:fontRef idx="minor">
+              <a:schemeClr val="lt1"/>
+            </a:fontRef>
+          </p:style>
+          <p:txBody>
+            <a:bodyPr rtlCol="0" anchor="ctr"/>
+            <a:lstStyle/>
+            <a:p>
+              <a:pPr algn="ctr"/>
+              <a:endParaRPr lang="en-US"/>
+            </a:p>
+          </p:txBody>
+        </p:sp>
+        <p:sp>
+          <p:nvSpPr>
+            <p:cNvPr id="4" name="TextBox 3">
+              <a:extLst>
+                <a:ext uri="{FF2B5EF4-FFF2-40B4-BE49-F238E27FC236}">
+                  <a16:creationId xmlns:a16="http://schemas.microsoft.com/office/drawing/2014/main" id="{DFBCB9DA-BC09-8C0F-7198-3F4BAD67ADE9}"/>
+                </a:ext>
+              </a:extLst>
+            </p:cNvPr>
+            <p:cNvSpPr txBox="1"/>
+            <p:nvPr/>
+          </p:nvSpPr>
+          <p:spPr>
+            <a:xfrm>
+              <a:off x="4281355" y="1174535"/>
+              <a:ext cx="2404152" cy="4508927"/>
+            </a:xfrm>
+            <a:prstGeom prst="rect">
+              <a:avLst/>
+            </a:prstGeom>
+            <a:noFill/>
+          </p:spPr>
+          <p:txBody>
+            <a:bodyPr wrap="square" rtlCol="0">
+              <a:spAutoFit/>
+            </a:bodyPr>
+            <a:lstStyle/>
+            <a:p>
+              <a:r>
+                <a:rPr lang="en-US" sz="28700" dirty="0"/>
+                <a:t>1</a:t>
+              </a:r>
+              <a:endParaRPr lang="en-US" dirty="0"/>
+            </a:p>
+          </p:txBody>
+        </p:sp>
+      </p:grpSp>
+    </p:spTree>
+    <p:extLst>
+      <p:ext uri="{BB962C8B-B14F-4D97-AF65-F5344CB8AC3E}">
+        <p14:creationId xmlns:p14="http://schemas.microsoft.com/office/powerpoint/2010/main" val="781438344"/>
+      </p:ext>
+    </p:extLst>
+  </p:cSld>
+  <p:clrMapOvr>
+    <a:masterClrMapping/>
+  </p:clrMapOvr>
+</p:sld>
+</file>
+
+<file path=ppt/slides/slide5.xml><?xml version="1.0" encoding="utf-8"?>
+<p:sld xmlns:a="http://schemas.openxmlformats.org/drawingml/2006/main" xmlns:r="http://schemas.openxmlformats.org/officeDocument/2006/relationships" xmlns:p="http://schemas.openxmlformats.org/presentationml/2006/main">
+  <p:cSld>
+    <p:spTree>
+      <p:nvGrpSpPr>
+        <p:cNvPr id="1" name=""/>
+        <p:cNvGrpSpPr/>
+        <p:nvPr/>
+      </p:nvGrpSpPr>
+      <p:grpSpPr>
+        <a:xfrm>
+          <a:off x="0" y="0"/>
+          <a:ext cx="0" cy="0"/>
+          <a:chOff x="0" y="0"/>
+          <a:chExt cx="0" cy="0"/>
+        </a:xfrm>
+      </p:grpSpPr>
+      <p:grpSp>
+        <p:nvGrpSpPr>
+          <p:cNvPr id="11" name="Group 10">
+            <a:extLst>
+              <a:ext uri="{FF2B5EF4-FFF2-40B4-BE49-F238E27FC236}">
+                <a16:creationId xmlns:a16="http://schemas.microsoft.com/office/drawing/2014/main" id="{98BA4467-FABF-CA12-7884-DCB5FB746A49}"/>
+              </a:ext>
+            </a:extLst>
+          </p:cNvPr>
+          <p:cNvGrpSpPr/>
+          <p:nvPr/>
+        </p:nvGrpSpPr>
+        <p:grpSpPr>
+          <a:xfrm>
+            <a:off x="3359650" y="872053"/>
+            <a:ext cx="7679131" cy="5113894"/>
+            <a:chOff x="3359650" y="872053"/>
+            <a:chExt cx="7679131" cy="5113894"/>
+          </a:xfrm>
+        </p:grpSpPr>
+        <p:pic>
+          <p:nvPicPr>
+            <p:cNvPr id="10" name="Picture 9">
+              <a:extLst>
+                <a:ext uri="{FF2B5EF4-FFF2-40B4-BE49-F238E27FC236}">
+                  <a16:creationId xmlns:a16="http://schemas.microsoft.com/office/drawing/2014/main" id="{58F94A49-E6D4-7E6A-AF34-6C321E90A583}"/>
+                </a:ext>
+              </a:extLst>
+            </p:cNvPr>
+            <p:cNvPicPr>
+              <a:picLocks noChangeAspect="1"/>
+            </p:cNvPicPr>
+            <p:nvPr/>
+          </p:nvPicPr>
+          <p:blipFill>
+            <a:blip r:embed="rId2"/>
+            <a:stretch>
+              <a:fillRect/>
+            </a:stretch>
+          </p:blipFill>
+          <p:spPr>
+            <a:xfrm>
+              <a:off x="3359650" y="872053"/>
+              <a:ext cx="7679131" cy="5113894"/>
+            </a:xfrm>
+            <a:prstGeom prst="rect">
+              <a:avLst/>
+            </a:prstGeom>
+          </p:spPr>
+        </p:pic>
+        <p:pic>
+          <p:nvPicPr>
+            <p:cNvPr id="5" name="Picture 4">
+              <a:extLst>
+                <a:ext uri="{FF2B5EF4-FFF2-40B4-BE49-F238E27FC236}">
+                  <a16:creationId xmlns:a16="http://schemas.microsoft.com/office/drawing/2014/main" id="{5DFC8F26-6701-4D34-8A36-2425CFA2540F}"/>
+                </a:ext>
+              </a:extLst>
+            </p:cNvPr>
+            <p:cNvPicPr>
+              <a:picLocks noChangeAspect="1"/>
+            </p:cNvPicPr>
+            <p:nvPr/>
+          </p:nvPicPr>
+          <p:blipFill>
+            <a:blip r:embed="rId3"/>
+            <a:stretch>
+              <a:fillRect/>
+            </a:stretch>
+          </p:blipFill>
+          <p:spPr>
+            <a:xfrm>
+              <a:off x="5124519" y="1705151"/>
+              <a:ext cx="4149392" cy="3447697"/>
+            </a:xfrm>
+            <a:prstGeom prst="rect">
+              <a:avLst/>
+            </a:prstGeom>
+          </p:spPr>
+        </p:pic>
+      </p:grpSp>
+    </p:spTree>
+    <p:extLst>
+      <p:ext uri="{BB962C8B-B14F-4D97-AF65-F5344CB8AC3E}">
+        <p14:creationId xmlns:p14="http://schemas.microsoft.com/office/powerpoint/2010/main" val="443992844"/>
+      </p:ext>
+    </p:extLst>
+  </p:cSld>
+  <p:clrMapOvr>
+    <a:masterClrMapping/>
+  </p:clrMapOvr>
+</p:sld>
+</file>
+
+<file path=ppt/slides/slide6.xml><?xml version="1.0" encoding="utf-8"?>
+<p:sld xmlns:a="http://schemas.openxmlformats.org/drawingml/2006/main" xmlns:r="http://schemas.openxmlformats.org/officeDocument/2006/relationships" xmlns:p="http://schemas.openxmlformats.org/presentationml/2006/main">
+  <p:cSld>
+    <p:spTree>
+      <p:nvGrpSpPr>
+        <p:cNvPr id="1" name=""/>
+        <p:cNvGrpSpPr/>
+        <p:nvPr/>
+      </p:nvGrpSpPr>
+      <p:grpSpPr>
+        <a:xfrm>
+          <a:off x="0" y="0"/>
+          <a:ext cx="0" cy="0"/>
+          <a:chOff x="0" y="0"/>
+          <a:chExt cx="0" cy="0"/>
+        </a:xfrm>
+      </p:grpSpPr>
+      <p:grpSp>
+        <p:nvGrpSpPr>
+          <p:cNvPr id="4" name="Group 3">
+            <a:extLst>
+              <a:ext uri="{FF2B5EF4-FFF2-40B4-BE49-F238E27FC236}">
+                <a16:creationId xmlns:a16="http://schemas.microsoft.com/office/drawing/2014/main" id="{3540DCA3-7DDB-851D-2AE0-0008D75826E5}"/>
+              </a:ext>
+            </a:extLst>
+          </p:cNvPr>
+          <p:cNvGrpSpPr/>
+          <p:nvPr/>
+        </p:nvGrpSpPr>
+        <p:grpSpPr>
+          <a:xfrm>
+            <a:off x="3359650" y="872053"/>
+            <a:ext cx="7679131" cy="5113894"/>
+            <a:chOff x="3359650" y="872053"/>
+            <a:chExt cx="7679131" cy="5113894"/>
+          </a:xfrm>
+        </p:grpSpPr>
+        <p:pic>
+          <p:nvPicPr>
+            <p:cNvPr id="10" name="Picture 9">
+              <a:extLst>
+                <a:ext uri="{FF2B5EF4-FFF2-40B4-BE49-F238E27FC236}">
+                  <a16:creationId xmlns:a16="http://schemas.microsoft.com/office/drawing/2014/main" id="{58F94A49-E6D4-7E6A-AF34-6C321E90A583}"/>
+                </a:ext>
+              </a:extLst>
+            </p:cNvPr>
+            <p:cNvPicPr>
+              <a:picLocks noChangeAspect="1"/>
+            </p:cNvPicPr>
+            <p:nvPr/>
+          </p:nvPicPr>
+          <p:blipFill>
+            <a:blip r:embed="rId2"/>
+            <a:stretch>
+              <a:fillRect/>
+            </a:stretch>
+          </p:blipFill>
+          <p:spPr>
+            <a:xfrm>
+              <a:off x="3359650" y="872053"/>
+              <a:ext cx="7679131" cy="5113894"/>
+            </a:xfrm>
+            <a:prstGeom prst="rect">
+              <a:avLst/>
+            </a:prstGeom>
+          </p:spPr>
+        </p:pic>
+        <p:sp>
+          <p:nvSpPr>
+            <p:cNvPr id="3" name="TextBox 2">
+              <a:extLst>
+                <a:ext uri="{FF2B5EF4-FFF2-40B4-BE49-F238E27FC236}">
+                  <a16:creationId xmlns:a16="http://schemas.microsoft.com/office/drawing/2014/main" id="{DE769EB3-976B-8DAD-FE40-C4B38E36104E}"/>
+                </a:ext>
+              </a:extLst>
+            </p:cNvPr>
+            <p:cNvSpPr txBox="1"/>
+            <p:nvPr/>
+          </p:nvSpPr>
+          <p:spPr>
+            <a:xfrm>
+              <a:off x="3438875" y="1448651"/>
+              <a:ext cx="7492828" cy="4508927"/>
+            </a:xfrm>
+            <a:prstGeom prst="rect">
+              <a:avLst/>
+            </a:prstGeom>
+            <a:noFill/>
+          </p:spPr>
+          <p:txBody>
+            <a:bodyPr wrap="square" rtlCol="0">
+              <a:spAutoFit/>
+            </a:bodyPr>
+            <a:lstStyle/>
+            <a:p>
+              <a:pPr algn="ctr"/>
+              <a:r>
+                <a:rPr lang="en-US" sz="28700" dirty="0">
+                  <a:solidFill>
+                    <a:schemeClr val="bg1"/>
+                  </a:solidFill>
+                  <a:effectLst/>
+                  <a:latin typeface="Menlo" panose="020B0609030804020204" pitchFamily="49" charset="0"/>
+                </a:rPr>
+                <a:t>٣</a:t>
+              </a:r>
+              <a:endParaRPr lang="en-US" sz="2000" dirty="0">
+                <a:solidFill>
+                  <a:schemeClr val="bg1"/>
+                </a:solidFill>
+                <a:effectLst/>
+                <a:latin typeface="Menlo" panose="020B0609030804020204" pitchFamily="49" charset="0"/>
+              </a:endParaRPr>
+            </a:p>
+          </p:txBody>
+        </p:sp>
+      </p:grpSp>
+    </p:spTree>
+    <p:extLst>
+      <p:ext uri="{BB962C8B-B14F-4D97-AF65-F5344CB8AC3E}">
+        <p14:creationId xmlns:p14="http://schemas.microsoft.com/office/powerpoint/2010/main" val="564751667"/>
+      </p:ext>
+    </p:extLst>
+  </p:cSld>
+  <p:clrMapOvr>
+    <a:masterClrMapping/>
+  </p:clrMapOvr>
+</p:sld>
+</file>
+
+<file path=ppt/slides/slide7.xml><?xml version="1.0" encoding="utf-8"?>
+<p:sld xmlns:a="http://schemas.openxmlformats.org/drawingml/2006/main" xmlns:r="http://schemas.openxmlformats.org/officeDocument/2006/relationships" xmlns:p="http://schemas.openxmlformats.org/presentationml/2006/main">
+  <p:cSld>
+    <p:spTree>
+      <p:nvGrpSpPr>
+        <p:cNvPr id="1" name=""/>
+        <p:cNvGrpSpPr/>
+        <p:nvPr/>
+      </p:nvGrpSpPr>
+      <p:grpSpPr>
+        <a:xfrm>
+          <a:off x="0" y="0"/>
+          <a:ext cx="0" cy="0"/>
+          <a:chOff x="0" y="0"/>
+          <a:chExt cx="0" cy="0"/>
+        </a:xfrm>
+      </p:grpSpPr>
+      <p:pic>
+        <p:nvPicPr>
+          <p:cNvPr id="3" name="Picture 2">
+            <a:extLst>
+              <a:ext uri="{FF2B5EF4-FFF2-40B4-BE49-F238E27FC236}">
+                <a16:creationId xmlns:a16="http://schemas.microsoft.com/office/drawing/2014/main" id="{122BA71B-D526-50BC-1578-0C3CC3DF9BEA}"/>
+              </a:ext>
+            </a:extLst>
+          </p:cNvPr>
+          <p:cNvPicPr>
+            <a:picLocks noChangeAspect="1"/>
+          </p:cNvPicPr>
+          <p:nvPr/>
+        </p:nvPicPr>
+        <p:blipFill>
+          <a:blip r:embed="rId2"/>
+          <a:stretch>
+            <a:fillRect/>
+          </a:stretch>
+        </p:blipFill>
+        <p:spPr>
+          <a:xfrm>
+            <a:off x="3973316" y="2028075"/>
+            <a:ext cx="3228868" cy="2122684"/>
+          </a:xfrm>
+          <a:prstGeom prst="rect">
+            <a:avLst/>
+          </a:prstGeom>
+        </p:spPr>
+      </p:pic>
+      <p:sp>
+        <p:nvSpPr>
+          <p:cNvPr id="13" name="Rectangle 12">
+            <a:extLst>
+              <a:ext uri="{FF2B5EF4-FFF2-40B4-BE49-F238E27FC236}">
+                <a16:creationId xmlns:a16="http://schemas.microsoft.com/office/drawing/2014/main" id="{87E21DAD-2838-575D-B584-E8B882F72C2B}"/>
+              </a:ext>
+            </a:extLst>
+          </p:cNvPr>
+          <p:cNvSpPr/>
+          <p:nvPr/>
+        </p:nvSpPr>
+        <p:spPr>
+          <a:xfrm>
+            <a:off x="6096000" y="2028075"/>
+            <a:ext cx="1188468" cy="2122684"/>
+          </a:xfrm>
+          <a:prstGeom prst="rect">
+            <a:avLst/>
+          </a:prstGeom>
+          <a:solidFill>
+            <a:schemeClr val="bg1">
+              <a:lumMod val="85000"/>
+            </a:schemeClr>
+          </a:solidFill>
+          <a:ln>
+            <a:noFill/>
+          </a:ln>
+        </p:spPr>
+        <p:style>
+          <a:lnRef idx="2">
+            <a:schemeClr val="accent1">
+              <a:shade val="15000"/>
+            </a:schemeClr>
+          </a:lnRef>
+          <a:fillRef idx="1">
+            <a:schemeClr val="accent1"/>
+          </a:fillRef>
+          <a:effectRef idx="0">
+            <a:schemeClr val="accent1"/>
+          </a:effectRef>
+          <a:fontRef idx="minor">
+            <a:schemeClr val="lt1"/>
+          </a:fontRef>
+        </p:style>
+        <p:txBody>
+          <a:bodyPr wrap="none" lIns="0" tIns="0" rIns="0" bIns="0" rtlCol="0" anchor="ctr"/>
+          <a:lstStyle/>
+          <a:p>
+            <a:pPr algn="ctr"/>
+            <a:endParaRPr lang="en-US"/>
+          </a:p>
+        </p:txBody>
+      </p:sp>
+      <p:sp>
+        <p:nvSpPr>
+          <p:cNvPr id="14" name="TextBox 13">
+            <a:extLst>
+              <a:ext uri="{FF2B5EF4-FFF2-40B4-BE49-F238E27FC236}">
+                <a16:creationId xmlns:a16="http://schemas.microsoft.com/office/drawing/2014/main" id="{5089EA09-0A1C-B8CE-6E85-4046182C33B9}"/>
+              </a:ext>
+            </a:extLst>
+          </p:cNvPr>
+          <p:cNvSpPr txBox="1"/>
+          <p:nvPr/>
+        </p:nvSpPr>
+        <p:spPr>
+          <a:xfrm>
+            <a:off x="6291299" y="2352781"/>
+            <a:ext cx="815929" cy="1354217"/>
+          </a:xfrm>
+          <a:prstGeom prst="rect">
+            <a:avLst/>
+          </a:prstGeom>
+          <a:noFill/>
+        </p:spPr>
+        <p:txBody>
+          <a:bodyPr wrap="none" lIns="0" tIns="0" rIns="0" bIns="0" rtlCol="0">
+            <a:spAutoFit/>
+          </a:bodyPr>
+          <a:lstStyle/>
+          <a:p>
+            <a:r>
+              <a:rPr lang="hy-AM" sz="8800" b="0" i="0" dirty="0">
+                <a:solidFill>
+                  <a:srgbClr val="202122"/>
+                </a:solidFill>
+                <a:effectLst/>
+                <a:latin typeface="Arial" panose="020B0604020202020204" pitchFamily="34" charset="0"/>
+              </a:rPr>
+              <a:t>Ա</a:t>
+            </a:r>
+            <a:endParaRPr lang="en-US" dirty="0"/>
+          </a:p>
+        </p:txBody>
+      </p:sp>
+    </p:spTree>
+    <p:extLst>
+      <p:ext uri="{BB962C8B-B14F-4D97-AF65-F5344CB8AC3E}">
+        <p14:creationId xmlns:p14="http://schemas.microsoft.com/office/powerpoint/2010/main" val="2704576843"/>
+      </p:ext>
+    </p:extLst>
+  </p:cSld>
+  <p:clrMapOvr>
+    <a:masterClrMapping/>
+  </p:clrMapOvr>
+</p:sld>
+</file>
+
+<file path=ppt/slides/slide8.xml><?xml version="1.0" encoding="utf-8"?>
+<p:sld xmlns:a="http://schemas.openxmlformats.org/drawingml/2006/main" xmlns:r="http://schemas.openxmlformats.org/officeDocument/2006/relationships" xmlns:p="http://schemas.openxmlformats.org/presentationml/2006/main">
+  <p:cSld>
+    <p:spTree>
+      <p:nvGrpSpPr>
+        <p:cNvPr id="1" name=""/>
+        <p:cNvGrpSpPr/>
+        <p:nvPr/>
+      </p:nvGrpSpPr>
+      <p:grpSpPr>
+        <a:xfrm>
+          <a:off x="0" y="0"/>
+          <a:ext cx="0" cy="0"/>
+          <a:chOff x="0" y="0"/>
+          <a:chExt cx="0" cy="0"/>
+        </a:xfrm>
+      </p:grpSpPr>
+      <p:sp>
+        <p:nvSpPr>
+          <p:cNvPr id="3" name="TextBox 2">
+            <a:extLst>
+              <a:ext uri="{FF2B5EF4-FFF2-40B4-BE49-F238E27FC236}">
+                <a16:creationId xmlns:a16="http://schemas.microsoft.com/office/drawing/2014/main" id="{E7B3E9C4-306A-3F78-1048-C16A71EAC4FA}"/>
+              </a:ext>
+            </a:extLst>
+          </p:cNvPr>
+          <p:cNvSpPr txBox="1"/>
+          <p:nvPr/>
+        </p:nvSpPr>
+        <p:spPr>
+          <a:xfrm>
+            <a:off x="3603661" y="1851645"/>
+            <a:ext cx="6097712" cy="3154710"/>
+          </a:xfrm>
+          <a:prstGeom prst="rect">
+            <a:avLst/>
+          </a:prstGeom>
+          <a:noFill/>
+        </p:spPr>
+        <p:txBody>
+          <a:bodyPr wrap="square">
+            <a:spAutoFit/>
+          </a:bodyPr>
+          <a:lstStyle/>
+          <a:p>
+            <a:r>
+              <a:rPr lang="en-US" sz="19900" dirty="0">
+                <a:solidFill>
+                  <a:srgbClr val="000000"/>
+                </a:solidFill>
+                <a:effectLst/>
+                <a:latin typeface="Helvetica Neue" panose="02000503000000020004" pitchFamily="2" charset="0"/>
+              </a:rPr>
+              <a:t>𓁨</a:t>
+            </a:r>
+          </a:p>
+        </p:txBody>
+      </p:sp>
+    </p:spTree>
+    <p:extLst>
+      <p:ext uri="{BB962C8B-B14F-4D97-AF65-F5344CB8AC3E}">
+        <p14:creationId xmlns:p14="http://schemas.microsoft.com/office/powerpoint/2010/main" val="3525296759"/>
+      </p:ext>
+    </p:extLst>
+  </p:cSld>
+  <p:clrMapOvr>
+    <a:masterClrMapping/>
+  </p:clrMapOvr>
+</p:sld>
+</file>
+
+<file path=ppt/slides/slide9.xml><?xml version="1.0" encoding="utf-8"?>
+<p:sld xmlns:a="http://schemas.openxmlformats.org/drawingml/2006/main" xmlns:r="http://schemas.openxmlformats.org/officeDocument/2006/relationships" xmlns:p="http://schemas.openxmlformats.org/presentationml/2006/main">
+  <p:cSld>
+    <p:spTree>
+      <p:nvGrpSpPr>
+        <p:cNvPr id="1" name=""/>
+        <p:cNvGrpSpPr/>
+        <p:nvPr/>
+      </p:nvGrpSpPr>
+      <p:grpSpPr>
+        <a:xfrm>
+          <a:off x="0" y="0"/>
+          <a:ext cx="0" cy="0"/>
+          <a:chOff x="0" y="0"/>
+          <a:chExt cx="0" cy="0"/>
+        </a:xfrm>
+      </p:grpSpPr>
+      <p:pic>
+        <p:nvPicPr>
+          <p:cNvPr id="4" name="Picture 3">
+            <a:extLst>
+              <a:ext uri="{FF2B5EF4-FFF2-40B4-BE49-F238E27FC236}">
+                <a16:creationId xmlns:a16="http://schemas.microsoft.com/office/drawing/2014/main" id="{A60BF345-3DC5-1788-5733-373471D16074}"/>
+              </a:ext>
+            </a:extLst>
+          </p:cNvPr>
+          <p:cNvPicPr>
+            <a:picLocks noChangeAspect="1"/>
+          </p:cNvPicPr>
+          <p:nvPr/>
+        </p:nvPicPr>
+        <p:blipFill>
+          <a:blip r:embed="rId2"/>
+          <a:stretch>
+            <a:fillRect/>
+          </a:stretch>
+        </p:blipFill>
+        <p:spPr>
+          <a:xfrm>
+            <a:off x="4527550" y="2362200"/>
+            <a:ext cx="3136900" cy="2133600"/>
+          </a:xfrm>
+          <a:prstGeom prst="rect">
+            <a:avLst/>
+          </a:prstGeom>
+        </p:spPr>
+      </p:pic>
+    </p:spTree>
+    <p:extLst>
+      <p:ext uri="{BB962C8B-B14F-4D97-AF65-F5344CB8AC3E}">
+        <p14:creationId xmlns:p14="http://schemas.microsoft.com/office/powerpoint/2010/main" val="2183634110"/>
       </p:ext>
     </p:extLst>
   </p:cSld>

</xml_diff>